<commit_message>
Added updated golang sydney talk and compression benchmarking talk
</commit_message>
<xml_diff>
--- a/201405/pics sajari go preso.pptx
+++ b/201405/pics sajari go preso.pptx
@@ -8,6 +8,8 @@
     <p:sldId id="256" r:id="rId2"/>
     <p:sldId id="257" r:id="rId3"/>
     <p:sldId id="258" r:id="rId4"/>
+    <p:sldId id="259" r:id="rId5"/>
+    <p:sldId id="260" r:id="rId6"/>
   </p:sldIdLst>
   <p:sldSz cx="9144000" cy="6858000" type="screen4x3"/>
   <p:notesSz cx="6858000" cy="9144000"/>
@@ -290,7 +292,7 @@
           <a:p>
             <a:fld id="{679CE055-56BA-6644-94C7-14E4B308E345}" type="datetimeFigureOut">
               <a:rPr lang="en-US" smtClean="0"/>
-              <a:t>15/05/14</a:t>
+              <a:t>6/06/14</a:t>
             </a:fld>
             <a:endParaRPr lang="en-US"/>
           </a:p>
@@ -460,7 +462,7 @@
           <a:p>
             <a:fld id="{679CE055-56BA-6644-94C7-14E4B308E345}" type="datetimeFigureOut">
               <a:rPr lang="en-US" smtClean="0"/>
-              <a:t>15/05/14</a:t>
+              <a:t>6/06/14</a:t>
             </a:fld>
             <a:endParaRPr lang="en-US"/>
           </a:p>
@@ -640,7 +642,7 @@
           <a:p>
             <a:fld id="{679CE055-56BA-6644-94C7-14E4B308E345}" type="datetimeFigureOut">
               <a:rPr lang="en-US" smtClean="0"/>
-              <a:t>15/05/14</a:t>
+              <a:t>6/06/14</a:t>
             </a:fld>
             <a:endParaRPr lang="en-US"/>
           </a:p>
@@ -810,7 +812,7 @@
           <a:p>
             <a:fld id="{679CE055-56BA-6644-94C7-14E4B308E345}" type="datetimeFigureOut">
               <a:rPr lang="en-US" smtClean="0"/>
-              <a:t>15/05/14</a:t>
+              <a:t>6/06/14</a:t>
             </a:fld>
             <a:endParaRPr lang="en-US"/>
           </a:p>
@@ -1056,7 +1058,7 @@
           <a:p>
             <a:fld id="{679CE055-56BA-6644-94C7-14E4B308E345}" type="datetimeFigureOut">
               <a:rPr lang="en-US" smtClean="0"/>
-              <a:t>15/05/14</a:t>
+              <a:t>6/06/14</a:t>
             </a:fld>
             <a:endParaRPr lang="en-US"/>
           </a:p>
@@ -1344,7 +1346,7 @@
           <a:p>
             <a:fld id="{679CE055-56BA-6644-94C7-14E4B308E345}" type="datetimeFigureOut">
               <a:rPr lang="en-US" smtClean="0"/>
-              <a:t>15/05/14</a:t>
+              <a:t>6/06/14</a:t>
             </a:fld>
             <a:endParaRPr lang="en-US"/>
           </a:p>
@@ -1766,7 +1768,7 @@
           <a:p>
             <a:fld id="{679CE055-56BA-6644-94C7-14E4B308E345}" type="datetimeFigureOut">
               <a:rPr lang="en-US" smtClean="0"/>
-              <a:t>15/05/14</a:t>
+              <a:t>6/06/14</a:t>
             </a:fld>
             <a:endParaRPr lang="en-US"/>
           </a:p>
@@ -1884,7 +1886,7 @@
           <a:p>
             <a:fld id="{679CE055-56BA-6644-94C7-14E4B308E345}" type="datetimeFigureOut">
               <a:rPr lang="en-US" smtClean="0"/>
-              <a:t>15/05/14</a:t>
+              <a:t>6/06/14</a:t>
             </a:fld>
             <a:endParaRPr lang="en-US"/>
           </a:p>
@@ -1979,7 +1981,7 @@
           <a:p>
             <a:fld id="{679CE055-56BA-6644-94C7-14E4B308E345}" type="datetimeFigureOut">
               <a:rPr lang="en-US" smtClean="0"/>
-              <a:t>15/05/14</a:t>
+              <a:t>6/06/14</a:t>
             </a:fld>
             <a:endParaRPr lang="en-US"/>
           </a:p>
@@ -2256,7 +2258,7 @@
           <a:p>
             <a:fld id="{679CE055-56BA-6644-94C7-14E4B308E345}" type="datetimeFigureOut">
               <a:rPr lang="en-US" smtClean="0"/>
-              <a:t>15/05/14</a:t>
+              <a:t>6/06/14</a:t>
             </a:fld>
             <a:endParaRPr lang="en-US"/>
           </a:p>
@@ -2509,7 +2511,7 @@
           <a:p>
             <a:fld id="{679CE055-56BA-6644-94C7-14E4B308E345}" type="datetimeFigureOut">
               <a:rPr lang="en-US" smtClean="0"/>
-              <a:t>15/05/14</a:t>
+              <a:t>6/06/14</a:t>
             </a:fld>
             <a:endParaRPr lang="en-US"/>
           </a:p>
@@ -2722,7 +2724,7 @@
           <a:p>
             <a:fld id="{679CE055-56BA-6644-94C7-14E4B308E345}" type="datetimeFigureOut">
               <a:rPr lang="en-US" smtClean="0"/>
-              <a:t>15/05/14</a:t>
+              <a:t>6/06/14</a:t>
             </a:fld>
             <a:endParaRPr lang="en-US"/>
           </a:p>
@@ -4608,6 +4610,258 @@
     <p:extLst>
       <p:ext uri="{BB962C8B-B14F-4D97-AF65-F5344CB8AC3E}">
         <p14:creationId xmlns:p14="http://schemas.microsoft.com/office/powerpoint/2010/main" val="1312184413"/>
+      </p:ext>
+    </p:extLst>
+  </p:cSld>
+  <p:clrMapOvr>
+    <a:masterClrMapping/>
+  </p:clrMapOvr>
+</p:sld>
+</file>
+
+<file path=ppt/slides/slide4.xml><?xml version="1.0" encoding="utf-8"?>
+<p:sld xmlns:a="http://schemas.openxmlformats.org/drawingml/2006/main" xmlns:r="http://schemas.openxmlformats.org/officeDocument/2006/relationships" xmlns:p="http://schemas.openxmlformats.org/presentationml/2006/main">
+  <p:cSld>
+    <p:spTree>
+      <p:nvGrpSpPr>
+        <p:cNvPr id="1" name=""/>
+        <p:cNvGrpSpPr/>
+        <p:nvPr/>
+      </p:nvGrpSpPr>
+      <p:grpSpPr>
+        <a:xfrm>
+          <a:off x="0" y="0"/>
+          <a:ext cx="0" cy="0"/>
+          <a:chOff x="0" y="0"/>
+          <a:chExt cx="0" cy="0"/>
+        </a:xfrm>
+      </p:grpSpPr>
+      <p:pic>
+        <p:nvPicPr>
+          <p:cNvPr id="6" name="Picture 5"/>
+          <p:cNvPicPr>
+            <a:picLocks noChangeAspect="1"/>
+          </p:cNvPicPr>
+          <p:nvPr/>
+        </p:nvPicPr>
+        <p:blipFill>
+          <a:blip r:embed="rId2"/>
+          <a:stretch>
+            <a:fillRect/>
+          </a:stretch>
+        </p:blipFill>
+        <p:spPr>
+          <a:xfrm>
+            <a:off x="572038" y="2322711"/>
+            <a:ext cx="8183102" cy="5966304"/>
+          </a:xfrm>
+          <a:prstGeom prst="rect">
+            <a:avLst/>
+          </a:prstGeom>
+        </p:spPr>
+      </p:pic>
+      <p:pic>
+        <p:nvPicPr>
+          <p:cNvPr id="5" name="Picture 4"/>
+          <p:cNvPicPr>
+            <a:picLocks noChangeAspect="1"/>
+          </p:cNvPicPr>
+          <p:nvPr/>
+        </p:nvPicPr>
+        <p:blipFill>
+          <a:blip r:embed="rId3"/>
+          <a:stretch>
+            <a:fillRect/>
+          </a:stretch>
+        </p:blipFill>
+        <p:spPr>
+          <a:xfrm>
+            <a:off x="3157641" y="1451465"/>
+            <a:ext cx="2784268" cy="1620114"/>
+          </a:xfrm>
+          <a:prstGeom prst="rect">
+            <a:avLst/>
+          </a:prstGeom>
+        </p:spPr>
+      </p:pic>
+      <p:pic>
+        <p:nvPicPr>
+          <p:cNvPr id="4" name="Picture 3"/>
+          <p:cNvPicPr>
+            <a:picLocks noChangeAspect="1"/>
+          </p:cNvPicPr>
+          <p:nvPr/>
+        </p:nvPicPr>
+        <p:blipFill>
+          <a:blip r:embed="rId4"/>
+          <a:stretch>
+            <a:fillRect/>
+          </a:stretch>
+        </p:blipFill>
+        <p:spPr>
+          <a:xfrm>
+            <a:off x="3227668" y="954368"/>
+            <a:ext cx="3911600" cy="1206500"/>
+          </a:xfrm>
+          <a:prstGeom prst="rect">
+            <a:avLst/>
+          </a:prstGeom>
+        </p:spPr>
+      </p:pic>
+      <p:pic>
+        <p:nvPicPr>
+          <p:cNvPr id="7" name="Picture 6"/>
+          <p:cNvPicPr>
+            <a:picLocks noChangeAspect="1"/>
+          </p:cNvPicPr>
+          <p:nvPr/>
+        </p:nvPicPr>
+        <p:blipFill>
+          <a:blip r:embed="rId5"/>
+          <a:stretch>
+            <a:fillRect/>
+          </a:stretch>
+        </p:blipFill>
+        <p:spPr>
+          <a:xfrm>
+            <a:off x="5812013" y="794857"/>
+            <a:ext cx="1350773" cy="1350773"/>
+          </a:xfrm>
+          <a:prstGeom prst="rect">
+            <a:avLst/>
+          </a:prstGeom>
+        </p:spPr>
+      </p:pic>
+      <p:pic>
+        <p:nvPicPr>
+          <p:cNvPr id="8" name="Picture 7"/>
+          <p:cNvPicPr>
+            <a:picLocks noChangeAspect="1"/>
+          </p:cNvPicPr>
+          <p:nvPr/>
+        </p:nvPicPr>
+        <p:blipFill>
+          <a:blip r:embed="rId6"/>
+          <a:stretch>
+            <a:fillRect/>
+          </a:stretch>
+        </p:blipFill>
+        <p:spPr>
+          <a:xfrm>
+            <a:off x="8915303" y="100692"/>
+            <a:ext cx="3251200" cy="3251200"/>
+          </a:xfrm>
+          <a:prstGeom prst="rect">
+            <a:avLst/>
+          </a:prstGeom>
+        </p:spPr>
+      </p:pic>
+      <p:pic>
+        <p:nvPicPr>
+          <p:cNvPr id="9" name="Picture 8"/>
+          <p:cNvPicPr>
+            <a:picLocks noChangeAspect="1"/>
+          </p:cNvPicPr>
+          <p:nvPr/>
+        </p:nvPicPr>
+        <p:blipFill>
+          <a:blip r:embed="rId7"/>
+          <a:stretch>
+            <a:fillRect/>
+          </a:stretch>
+        </p:blipFill>
+        <p:spPr>
+          <a:xfrm>
+            <a:off x="1791103" y="818373"/>
+            <a:ext cx="1366011" cy="1366011"/>
+          </a:xfrm>
+          <a:prstGeom prst="rect">
+            <a:avLst/>
+          </a:prstGeom>
+        </p:spPr>
+      </p:pic>
+      <p:pic>
+        <p:nvPicPr>
+          <p:cNvPr id="10" name="Picture 9"/>
+          <p:cNvPicPr>
+            <a:picLocks noChangeAspect="1"/>
+          </p:cNvPicPr>
+          <p:nvPr/>
+        </p:nvPicPr>
+        <p:blipFill>
+          <a:blip r:embed="rId8"/>
+          <a:stretch>
+            <a:fillRect/>
+          </a:stretch>
+        </p:blipFill>
+        <p:spPr>
+          <a:xfrm>
+            <a:off x="4423023" y="794857"/>
+            <a:ext cx="1375000" cy="1375000"/>
+          </a:xfrm>
+          <a:prstGeom prst="rect">
+            <a:avLst/>
+          </a:prstGeom>
+        </p:spPr>
+      </p:pic>
+      <p:pic>
+        <p:nvPicPr>
+          <p:cNvPr id="11" name="Picture 10"/>
+          <p:cNvPicPr>
+            <a:picLocks noChangeAspect="1"/>
+          </p:cNvPicPr>
+          <p:nvPr/>
+        </p:nvPicPr>
+        <p:blipFill>
+          <a:blip r:embed="rId9"/>
+          <a:stretch>
+            <a:fillRect/>
+          </a:stretch>
+        </p:blipFill>
+        <p:spPr>
+          <a:xfrm>
+            <a:off x="3074199" y="805485"/>
+            <a:ext cx="1360583" cy="1360583"/>
+          </a:xfrm>
+          <a:prstGeom prst="rect">
+            <a:avLst/>
+          </a:prstGeom>
+        </p:spPr>
+      </p:pic>
+    </p:spTree>
+    <p:extLst>
+      <p:ext uri="{BB962C8B-B14F-4D97-AF65-F5344CB8AC3E}">
+        <p14:creationId xmlns:p14="http://schemas.microsoft.com/office/powerpoint/2010/main" val="1702758793"/>
+      </p:ext>
+    </p:extLst>
+  </p:cSld>
+  <p:clrMapOvr>
+    <a:masterClrMapping/>
+  </p:clrMapOvr>
+</p:sld>
+</file>
+
+<file path=ppt/slides/slide5.xml><?xml version="1.0" encoding="utf-8"?>
+<p:sld xmlns:a="http://schemas.openxmlformats.org/drawingml/2006/main" xmlns:r="http://schemas.openxmlformats.org/officeDocument/2006/relationships" xmlns:p="http://schemas.openxmlformats.org/presentationml/2006/main">
+  <p:cSld>
+    <p:spTree>
+      <p:nvGrpSpPr>
+        <p:cNvPr id="1" name=""/>
+        <p:cNvGrpSpPr/>
+        <p:nvPr/>
+      </p:nvGrpSpPr>
+      <p:grpSpPr>
+        <a:xfrm>
+          <a:off x="0" y="0"/>
+          <a:ext cx="0" cy="0"/>
+          <a:chOff x="0" y="0"/>
+          <a:chExt cx="0" cy="0"/>
+        </a:xfrm>
+      </p:grpSpPr>
+    </p:spTree>
+    <p:extLst>
+      <p:ext uri="{BB962C8B-B14F-4D97-AF65-F5344CB8AC3E}">
+        <p14:creationId xmlns:p14="http://schemas.microsoft.com/office/powerpoint/2010/main" val="1912198305"/>
       </p:ext>
     </p:extLst>
   </p:cSld>

</xml_diff>